<commit_message>
adding tweaks to styles in Common Slides
</commit_message>
<xml_diff>
--- a/Slides/Common Slides for CS 5010.pptx
+++ b/Slides/Common Slides for CS 5010.pptx
@@ -241,7 +241,7 @@
           <a:p>
             <a:fld id="{03B24962-D7B5-4FEA-ABE9-8C89DFE85AA1}" type="datetimeFigureOut">
               <a:rPr lang="en-US" smtClean="0"/>
-              <a:t>8/3/2015</a:t>
+              <a:t>8/4/2015</a:t>
             </a:fld>
             <a:endParaRPr lang="en-US"/>
           </a:p>
@@ -1854,6 +1854,18 @@
             <a:ext cx="7772400" cy="1470025"/>
           </a:xfrm>
         </p:spPr>
+        <p:style>
+          <a:lnRef idx="2">
+            <a:schemeClr val="accent1"/>
+          </a:lnRef>
+          <a:fillRef idx="1">
+            <a:schemeClr val="lt1"/>
+          </a:fillRef>
+          <a:effectRef idx="0">
+            <a:schemeClr val="accent1"/>
+          </a:effectRef>
+          <a:fontRef idx="none"/>
+        </p:style>
         <p:txBody>
           <a:bodyPr/>
           <a:lstStyle/>
@@ -2002,7 +2014,7 @@
           <a:p>
             <a:fld id="{2F1F79F5-7BEC-496A-AFC7-876E38F64D71}" type="datetime1">
               <a:rPr lang="en-US" smtClean="0"/>
-              <a:t>8/3/2015</a:t>
+              <a:t>8/4/2015</a:t>
             </a:fld>
             <a:endParaRPr lang="en-US"/>
           </a:p>
@@ -2104,7 +2116,7 @@
           <a:p>
             <a:fld id="{0A05703A-7669-4FEA-9056-25299B4D29D4}" type="datetime1">
               <a:rPr lang="en-US" smtClean="0"/>
-              <a:t>8/3/2015</a:t>
+              <a:t>8/4/2015</a:t>
             </a:fld>
             <a:endParaRPr lang="en-US"/>
           </a:p>
@@ -2381,7 +2393,7 @@
           <a:p>
             <a:fld id="{6E5077B5-BB57-49DB-88CA-226A139E5C01}" type="datetime1">
               <a:rPr lang="en-US" smtClean="0"/>
-              <a:t>8/3/2015</a:t>
+              <a:t>8/4/2015</a:t>
             </a:fld>
             <a:endParaRPr lang="en-US"/>
           </a:p>
@@ -2634,7 +2646,7 @@
           <a:p>
             <a:fld id="{C48D9447-CBD6-49A1-89FD-8512A8CF8999}" type="datetime1">
               <a:rPr lang="en-US" smtClean="0"/>
-              <a:t>8/3/2015</a:t>
+              <a:t>8/4/2015</a:t>
             </a:fld>
             <a:endParaRPr lang="en-US"/>
           </a:p>
@@ -2804,7 +2816,7 @@
           <a:p>
             <a:fld id="{A3639A2A-823D-48B7-9ACE-7FAF42870BA9}" type="datetime1">
               <a:rPr lang="en-US" smtClean="0"/>
-              <a:t>8/3/2015</a:t>
+              <a:t>8/4/2015</a:t>
             </a:fld>
             <a:endParaRPr lang="en-US"/>
           </a:p>
@@ -2984,7 +2996,7 @@
           <a:p>
             <a:fld id="{ED1B6996-82E9-463C-972C-7B56056E426C}" type="datetime1">
               <a:rPr lang="en-US" smtClean="0"/>
-              <a:t>8/3/2015</a:t>
+              <a:t>8/4/2015</a:t>
             </a:fld>
             <a:endParaRPr lang="en-US"/>
           </a:p>
@@ -3160,7 +3172,7 @@
           <a:p>
             <a:fld id="{E22ED4DA-448D-4BB1-B935-CC112220207B}" type="datetime1">
               <a:rPr lang="en-US" smtClean="0"/>
-              <a:t>8/3/2015</a:t>
+              <a:t>8/4/2015</a:t>
             </a:fld>
             <a:endParaRPr lang="en-US"/>
           </a:p>
@@ -3342,7 +3354,7 @@
           <a:p>
             <a:fld id="{E22ED4DA-448D-4BB1-B935-CC112220207B}" type="datetime1">
               <a:rPr lang="en-US" smtClean="0"/>
-              <a:t>8/3/2015</a:t>
+              <a:t>8/4/2015</a:t>
             </a:fld>
             <a:endParaRPr lang="en-US"/>
           </a:p>
@@ -3549,8 +3561,14 @@
           <a:bodyPr/>
           <a:lstStyle>
             <a:lvl1pPr marL="0" indent="0">
+              <a:lnSpc>
+                <a:spcPct val="100000"/>
+              </a:lnSpc>
+              <a:spcBef>
+                <a:spcPts val="0"/>
+              </a:spcBef>
               <a:buNone/>
-              <a:defRPr b="1">
+              <a:defRPr sz="2000" b="1">
                 <a:latin typeface="Consolas" pitchFamily="49" charset="0"/>
                 <a:cs typeface="Consolas" pitchFamily="49" charset="0"/>
               </a:defRPr>
@@ -3611,7 +3629,7 @@
           <a:p>
             <a:fld id="{FF5D65A6-AB94-4435-B0B7-3743215FA46C}" type="datetime1">
               <a:rPr lang="en-US" smtClean="0"/>
-              <a:t>8/3/2015</a:t>
+              <a:t>8/4/2015</a:t>
             </a:fld>
             <a:endParaRPr lang="en-US"/>
           </a:p>
@@ -3796,7 +3814,7 @@
           <a:p>
             <a:fld id="{FF5D65A6-AB94-4435-B0B7-3743215FA46C}" type="datetime1">
               <a:rPr lang="en-US" smtClean="0"/>
-              <a:t>8/3/2015</a:t>
+              <a:t>8/4/2015</a:t>
             </a:fld>
             <a:endParaRPr lang="en-US"/>
           </a:p>
@@ -4098,7 +4116,7 @@
           <a:p>
             <a:fld id="{7C193DC4-6EF0-48C9-B29C-616106A645E1}" type="datetime1">
               <a:rPr lang="en-US" smtClean="0"/>
-              <a:t>8/3/2015</a:t>
+              <a:t>8/4/2015</a:t>
             </a:fld>
             <a:endParaRPr lang="en-US"/>
           </a:p>
@@ -4386,7 +4404,7 @@
           <a:p>
             <a:fld id="{5D1846AD-9252-4647-9435-4C2AC365653A}" type="datetime1">
               <a:rPr lang="en-US" smtClean="0"/>
-              <a:t>8/3/2015</a:t>
+              <a:t>8/4/2015</a:t>
             </a:fld>
             <a:endParaRPr lang="en-US"/>
           </a:p>
@@ -4808,7 +4826,7 @@
           <a:p>
             <a:fld id="{CE56DC10-3561-4063-A6AF-C1CC7A41040A}" type="datetime1">
               <a:rPr lang="en-US" smtClean="0"/>
-              <a:t>8/3/2015</a:t>
+              <a:t>8/4/2015</a:t>
             </a:fld>
             <a:endParaRPr lang="en-US"/>
           </a:p>
@@ -4926,7 +4944,7 @@
           <a:p>
             <a:fld id="{2F7B77F5-1464-4F6B-92A8-64FC8A508293}" type="datetime1">
               <a:rPr lang="en-US" smtClean="0"/>
-              <a:t>8/3/2015</a:t>
+              <a:t>8/4/2015</a:t>
             </a:fld>
             <a:endParaRPr lang="en-US"/>
           </a:p>
@@ -5146,7 +5164,7 @@
           <a:p>
             <a:fld id="{02B3F677-983B-48DB-ADFD-63FE6CBC7FB2}" type="datetime1">
               <a:rPr lang="en-US" smtClean="0"/>
-              <a:t>8/3/2015</a:t>
+              <a:t>8/4/2015</a:t>
             </a:fld>
             <a:endParaRPr lang="en-US"/>
           </a:p>

</xml_diff>

<commit_message>
published Slides and Examples for Modules 00-02
</commit_message>
<xml_diff>
--- a/Slides/Common Slides for CS 5010.pptx
+++ b/Slides/Common Slides for CS 5010.pptx
@@ -241,7 +241,7 @@
           <a:p>
             <a:fld id="{03B24962-D7B5-4FEA-ABE9-8C89DFE85AA1}" type="datetimeFigureOut">
               <a:rPr lang="en-US" smtClean="0"/>
-              <a:t>8/4/2015</a:t>
+              <a:t>8/5/2015</a:t>
             </a:fld>
             <a:endParaRPr lang="en-US"/>
           </a:p>
@@ -1854,18 +1854,6 @@
             <a:ext cx="7772400" cy="1470025"/>
           </a:xfrm>
         </p:spPr>
-        <p:style>
-          <a:lnRef idx="2">
-            <a:schemeClr val="accent1"/>
-          </a:lnRef>
-          <a:fillRef idx="1">
-            <a:schemeClr val="lt1"/>
-          </a:fillRef>
-          <a:effectRef idx="0">
-            <a:schemeClr val="accent1"/>
-          </a:effectRef>
-          <a:fontRef idx="none"/>
-        </p:style>
         <p:txBody>
           <a:bodyPr/>
           <a:lstStyle/>
@@ -2014,7 +2002,7 @@
           <a:p>
             <a:fld id="{2F1F79F5-7BEC-496A-AFC7-876E38F64D71}" type="datetime1">
               <a:rPr lang="en-US" smtClean="0"/>
-              <a:t>8/4/2015</a:t>
+              <a:t>8/5/2015</a:t>
             </a:fld>
             <a:endParaRPr lang="en-US"/>
           </a:p>
@@ -2116,7 +2104,7 @@
           <a:p>
             <a:fld id="{0A05703A-7669-4FEA-9056-25299B4D29D4}" type="datetime1">
               <a:rPr lang="en-US" smtClean="0"/>
-              <a:t>8/4/2015</a:t>
+              <a:t>8/5/2015</a:t>
             </a:fld>
             <a:endParaRPr lang="en-US"/>
           </a:p>
@@ -2393,7 +2381,7 @@
           <a:p>
             <a:fld id="{6E5077B5-BB57-49DB-88CA-226A139E5C01}" type="datetime1">
               <a:rPr lang="en-US" smtClean="0"/>
-              <a:t>8/4/2015</a:t>
+              <a:t>8/5/2015</a:t>
             </a:fld>
             <a:endParaRPr lang="en-US"/>
           </a:p>
@@ -2646,7 +2634,7 @@
           <a:p>
             <a:fld id="{C48D9447-CBD6-49A1-89FD-8512A8CF8999}" type="datetime1">
               <a:rPr lang="en-US" smtClean="0"/>
-              <a:t>8/4/2015</a:t>
+              <a:t>8/5/2015</a:t>
             </a:fld>
             <a:endParaRPr lang="en-US"/>
           </a:p>
@@ -2816,7 +2804,7 @@
           <a:p>
             <a:fld id="{A3639A2A-823D-48B7-9ACE-7FAF42870BA9}" type="datetime1">
               <a:rPr lang="en-US" smtClean="0"/>
-              <a:t>8/4/2015</a:t>
+              <a:t>8/5/2015</a:t>
             </a:fld>
             <a:endParaRPr lang="en-US"/>
           </a:p>
@@ -2996,7 +2984,7 @@
           <a:p>
             <a:fld id="{ED1B6996-82E9-463C-972C-7B56056E426C}" type="datetime1">
               <a:rPr lang="en-US" smtClean="0"/>
-              <a:t>8/4/2015</a:t>
+              <a:t>8/5/2015</a:t>
             </a:fld>
             <a:endParaRPr lang="en-US"/>
           </a:p>
@@ -3172,7 +3160,7 @@
           <a:p>
             <a:fld id="{E22ED4DA-448D-4BB1-B935-CC112220207B}" type="datetime1">
               <a:rPr lang="en-US" smtClean="0"/>
-              <a:t>8/4/2015</a:t>
+              <a:t>8/5/2015</a:t>
             </a:fld>
             <a:endParaRPr lang="en-US"/>
           </a:p>
@@ -3354,7 +3342,7 @@
           <a:p>
             <a:fld id="{E22ED4DA-448D-4BB1-B935-CC112220207B}" type="datetime1">
               <a:rPr lang="en-US" smtClean="0"/>
-              <a:t>8/4/2015</a:t>
+              <a:t>8/5/2015</a:t>
             </a:fld>
             <a:endParaRPr lang="en-US"/>
           </a:p>
@@ -3561,14 +3549,8 @@
           <a:bodyPr/>
           <a:lstStyle>
             <a:lvl1pPr marL="0" indent="0">
-              <a:lnSpc>
-                <a:spcPct val="100000"/>
-              </a:lnSpc>
-              <a:spcBef>
-                <a:spcPts val="0"/>
-              </a:spcBef>
               <a:buNone/>
-              <a:defRPr sz="2000" b="1">
+              <a:defRPr b="1">
                 <a:latin typeface="Consolas" pitchFamily="49" charset="0"/>
                 <a:cs typeface="Consolas" pitchFamily="49" charset="0"/>
               </a:defRPr>
@@ -3629,7 +3611,7 @@
           <a:p>
             <a:fld id="{FF5D65A6-AB94-4435-B0B7-3743215FA46C}" type="datetime1">
               <a:rPr lang="en-US" smtClean="0"/>
-              <a:t>8/4/2015</a:t>
+              <a:t>8/5/2015</a:t>
             </a:fld>
             <a:endParaRPr lang="en-US"/>
           </a:p>
@@ -3814,7 +3796,7 @@
           <a:p>
             <a:fld id="{FF5D65A6-AB94-4435-B0B7-3743215FA46C}" type="datetime1">
               <a:rPr lang="en-US" smtClean="0"/>
-              <a:t>8/4/2015</a:t>
+              <a:t>8/5/2015</a:t>
             </a:fld>
             <a:endParaRPr lang="en-US"/>
           </a:p>
@@ -4116,7 +4098,7 @@
           <a:p>
             <a:fld id="{7C193DC4-6EF0-48C9-B29C-616106A645E1}" type="datetime1">
               <a:rPr lang="en-US" smtClean="0"/>
-              <a:t>8/4/2015</a:t>
+              <a:t>8/5/2015</a:t>
             </a:fld>
             <a:endParaRPr lang="en-US"/>
           </a:p>
@@ -4404,7 +4386,7 @@
           <a:p>
             <a:fld id="{5D1846AD-9252-4647-9435-4C2AC365653A}" type="datetime1">
               <a:rPr lang="en-US" smtClean="0"/>
-              <a:t>8/4/2015</a:t>
+              <a:t>8/5/2015</a:t>
             </a:fld>
             <a:endParaRPr lang="en-US"/>
           </a:p>
@@ -4826,7 +4808,7 @@
           <a:p>
             <a:fld id="{CE56DC10-3561-4063-A6AF-C1CC7A41040A}" type="datetime1">
               <a:rPr lang="en-US" smtClean="0"/>
-              <a:t>8/4/2015</a:t>
+              <a:t>8/5/2015</a:t>
             </a:fld>
             <a:endParaRPr lang="en-US"/>
           </a:p>
@@ -4944,7 +4926,7 @@
           <a:p>
             <a:fld id="{2F7B77F5-1464-4F6B-92A8-64FC8A508293}" type="datetime1">
               <a:rPr lang="en-US" smtClean="0"/>
-              <a:t>8/4/2015</a:t>
+              <a:t>8/5/2015</a:t>
             </a:fld>
             <a:endParaRPr lang="en-US"/>
           </a:p>
@@ -5053,6 +5035,18 @@
             <a:avLst/>
           </a:prstGeom>
         </p:spPr>
+        <p:style>
+          <a:lnRef idx="2">
+            <a:schemeClr val="accent1"/>
+          </a:lnRef>
+          <a:fillRef idx="1">
+            <a:schemeClr val="lt1"/>
+          </a:fillRef>
+          <a:effectRef idx="0">
+            <a:schemeClr val="accent1"/>
+          </a:effectRef>
+          <a:fontRef idx="none"/>
+        </p:style>
         <p:txBody>
           <a:bodyPr vert="horz" lIns="91440" tIns="45720" rIns="91440" bIns="45720" rtlCol="0" anchor="ctr">
             <a:normAutofit/>
@@ -5164,7 +5158,7 @@
           <a:p>
             <a:fld id="{02B3F677-983B-48DB-ADFD-63FE6CBC7FB2}" type="datetime1">
               <a:rPr lang="en-US" smtClean="0"/>
-              <a:t>8/4/2015</a:t>
+              <a:t>8/5/2015</a:t>
             </a:fld>
             <a:endParaRPr lang="en-US"/>
           </a:p>

</xml_diff>

<commit_message>
clarified tree-to-root in ps06
</commit_message>
<xml_diff>
--- a/Slides/Common Slides for CS 5010.pptx
+++ b/Slides/Common Slides for CS 5010.pptx
@@ -240,7 +240,7 @@
           <a:p>
             <a:fld id="{03B24962-D7B5-4FEA-ABE9-8C89DFE85AA1}" type="datetimeFigureOut">
               <a:rPr lang="en-US" smtClean="0"/>
-              <a:t>10/8/2015</a:t>
+              <a:t>10/19/2015</a:t>
             </a:fld>
             <a:endParaRPr lang="en-US"/>
           </a:p>
@@ -1917,7 +1917,7 @@
           <a:p>
             <a:fld id="{2F1F79F5-7BEC-496A-AFC7-876E38F64D71}" type="datetime1">
               <a:rPr lang="en-US" smtClean="0"/>
-              <a:t>10/8/2015</a:t>
+              <a:t>10/19/2015</a:t>
             </a:fld>
             <a:endParaRPr lang="en-US"/>
           </a:p>
@@ -2019,7 +2019,7 @@
           <a:p>
             <a:fld id="{0A05703A-7669-4FEA-9056-25299B4D29D4}" type="datetime1">
               <a:rPr lang="en-US" smtClean="0"/>
-              <a:t>10/8/2015</a:t>
+              <a:t>10/19/2015</a:t>
             </a:fld>
             <a:endParaRPr lang="en-US"/>
           </a:p>
@@ -2296,7 +2296,7 @@
           <a:p>
             <a:fld id="{6E5077B5-BB57-49DB-88CA-226A139E5C01}" type="datetime1">
               <a:rPr lang="en-US" smtClean="0"/>
-              <a:t>10/8/2015</a:t>
+              <a:t>10/19/2015</a:t>
             </a:fld>
             <a:endParaRPr lang="en-US"/>
           </a:p>
@@ -2549,7 +2549,7 @@
           <a:p>
             <a:fld id="{C48D9447-CBD6-49A1-89FD-8512A8CF8999}" type="datetime1">
               <a:rPr lang="en-US" smtClean="0"/>
-              <a:t>10/8/2015</a:t>
+              <a:t>10/19/2015</a:t>
             </a:fld>
             <a:endParaRPr lang="en-US"/>
           </a:p>
@@ -2719,7 +2719,7 @@
           <a:p>
             <a:fld id="{A3639A2A-823D-48B7-9ACE-7FAF42870BA9}" type="datetime1">
               <a:rPr lang="en-US" smtClean="0"/>
-              <a:t>10/8/2015</a:t>
+              <a:t>10/19/2015</a:t>
             </a:fld>
             <a:endParaRPr lang="en-US"/>
           </a:p>
@@ -2899,7 +2899,7 @@
           <a:p>
             <a:fld id="{ED1B6996-82E9-463C-972C-7B56056E426C}" type="datetime1">
               <a:rPr lang="en-US" smtClean="0"/>
-              <a:t>10/8/2015</a:t>
+              <a:t>10/19/2015</a:t>
             </a:fld>
             <a:endParaRPr lang="en-US"/>
           </a:p>
@@ -3075,7 +3075,7 @@
           <a:p>
             <a:fld id="{E22ED4DA-448D-4BB1-B935-CC112220207B}" type="datetime1">
               <a:rPr lang="en-US" smtClean="0"/>
-              <a:t>10/8/2015</a:t>
+              <a:t>10/19/2015</a:t>
             </a:fld>
             <a:endParaRPr lang="en-US"/>
           </a:p>
@@ -3257,7 +3257,7 @@
           <a:p>
             <a:fld id="{E22ED4DA-448D-4BB1-B935-CC112220207B}" type="datetime1">
               <a:rPr lang="en-US" smtClean="0"/>
-              <a:t>10/8/2015</a:t>
+              <a:t>10/19/2015</a:t>
             </a:fld>
             <a:endParaRPr lang="en-US"/>
           </a:p>
@@ -3526,7 +3526,7 @@
           <a:p>
             <a:fld id="{FF5D65A6-AB94-4435-B0B7-3743215FA46C}" type="datetime1">
               <a:rPr lang="en-US" smtClean="0"/>
-              <a:t>10/8/2015</a:t>
+              <a:t>10/19/2015</a:t>
             </a:fld>
             <a:endParaRPr lang="en-US"/>
           </a:p>
@@ -3711,7 +3711,7 @@
           <a:p>
             <a:fld id="{FF5D65A6-AB94-4435-B0B7-3743215FA46C}" type="datetime1">
               <a:rPr lang="en-US" smtClean="0"/>
-              <a:t>10/8/2015</a:t>
+              <a:t>10/19/2015</a:t>
             </a:fld>
             <a:endParaRPr lang="en-US"/>
           </a:p>
@@ -4013,7 +4013,7 @@
           <a:p>
             <a:fld id="{7C193DC4-6EF0-48C9-B29C-616106A645E1}" type="datetime1">
               <a:rPr lang="en-US" smtClean="0"/>
-              <a:t>10/8/2015</a:t>
+              <a:t>10/19/2015</a:t>
             </a:fld>
             <a:endParaRPr lang="en-US"/>
           </a:p>
@@ -4301,7 +4301,7 @@
           <a:p>
             <a:fld id="{5D1846AD-9252-4647-9435-4C2AC365653A}" type="datetime1">
               <a:rPr lang="en-US" smtClean="0"/>
-              <a:t>10/8/2015</a:t>
+              <a:t>10/19/2015</a:t>
             </a:fld>
             <a:endParaRPr lang="en-US"/>
           </a:p>
@@ -4723,7 +4723,7 @@
           <a:p>
             <a:fld id="{CE56DC10-3561-4063-A6AF-C1CC7A41040A}" type="datetime1">
               <a:rPr lang="en-US" smtClean="0"/>
-              <a:t>10/8/2015</a:t>
+              <a:t>10/19/2015</a:t>
             </a:fld>
             <a:endParaRPr lang="en-US"/>
           </a:p>
@@ -4841,7 +4841,7 @@
           <a:p>
             <a:fld id="{2F7B77F5-1464-4F6B-92A8-64FC8A508293}" type="datetime1">
               <a:rPr lang="en-US" smtClean="0"/>
-              <a:t>10/8/2015</a:t>
+              <a:t>10/19/2015</a:t>
             </a:fld>
             <a:endParaRPr lang="en-US"/>
           </a:p>
@@ -5073,7 +5073,7 @@
           <a:p>
             <a:fld id="{02B3F677-983B-48DB-ADFD-63FE6CBC7FB2}" type="datetime1">
               <a:rPr lang="en-US" smtClean="0"/>
-              <a:t>10/8/2015</a:t>
+              <a:t>10/19/2015</a:t>
             </a:fld>
             <a:endParaRPr lang="en-US"/>
           </a:p>
@@ -9903,13 +9903,8 @@
                     <a:p>
                       <a:r>
                         <a:rPr lang="en-US" sz="3200" dirty="0" smtClean="0"/>
-                        <a:t>5. Call a more general </a:t>
-                      </a:r>
-                      <a:r>
-                        <a:rPr lang="en-US" sz="3200" dirty="0" smtClean="0"/>
-                        <a:t>function</a:t>
-                      </a:r>
-                      <a:endParaRPr lang="en-US" sz="3200" dirty="0" smtClean="0"/>
+                        <a:t>5. Call a more general function</a:t>
+                      </a:r>
                     </a:p>
                   </a:txBody>
                   <a:tcPr/>
@@ -9925,7 +9920,6 @@
                         <a:rPr lang="en-US" sz="3200" dirty="0" smtClean="0"/>
                         <a:t>6. General Recursion</a:t>
                       </a:r>
-                      <a:endParaRPr lang="en-US" sz="3200" dirty="0" smtClean="0"/>
                     </a:p>
                   </a:txBody>
                   <a:tcPr/>
@@ -13465,447 +13459,6 @@
           </p:style>
         </p:cxnSp>
       </p:grpSp>
-      <p:grpSp>
-        <p:nvGrpSpPr>
-          <p:cNvPr id="80" name="Group 79"/>
-          <p:cNvGrpSpPr/>
-          <p:nvPr/>
-        </p:nvGrpSpPr>
-        <p:grpSpPr>
-          <a:xfrm>
-            <a:off x="3657600" y="951104"/>
-            <a:ext cx="1828800" cy="5373496"/>
-            <a:chOff x="2598691" y="951104"/>
-            <a:chExt cx="1828800" cy="5373496"/>
-          </a:xfrm>
-        </p:grpSpPr>
-        <p:sp>
-          <p:nvSpPr>
-            <p:cNvPr id="6" name="Rounded Rectangle 5"/>
-            <p:cNvSpPr/>
-            <p:nvPr/>
-          </p:nvSpPr>
-          <p:spPr>
-            <a:xfrm>
-              <a:off x="2598691" y="951104"/>
-              <a:ext cx="1828800" cy="533400"/>
-            </a:xfrm>
-            <a:prstGeom prst="roundRect">
-              <a:avLst/>
-            </a:prstGeom>
-          </p:spPr>
-          <p:style>
-            <a:lnRef idx="0">
-              <a:schemeClr val="accent1"/>
-            </a:lnRef>
-            <a:fillRef idx="3">
-              <a:schemeClr val="accent1"/>
-            </a:fillRef>
-            <a:effectRef idx="3">
-              <a:schemeClr val="accent1"/>
-            </a:effectRef>
-            <a:fontRef idx="minor">
-              <a:schemeClr val="lt1"/>
-            </a:fontRef>
-          </p:style>
-          <p:txBody>
-            <a:bodyPr rtlCol="0" anchor="ctr"/>
-            <a:lstStyle/>
-            <a:p>
-              <a:pPr algn="ctr"/>
-              <a:r>
-                <a:rPr lang="en-US" dirty="0" smtClean="0"/>
-                <a:t>Design Strategies</a:t>
-              </a:r>
-              <a:endParaRPr lang="en-US" dirty="0"/>
-            </a:p>
-          </p:txBody>
-        </p:sp>
-        <p:sp>
-          <p:nvSpPr>
-            <p:cNvPr id="13" name="Rounded Rectangle 12"/>
-            <p:cNvSpPr/>
-            <p:nvPr/>
-          </p:nvSpPr>
-          <p:spPr>
-            <a:xfrm>
-              <a:off x="2598691" y="1757787"/>
-              <a:ext cx="1828800" cy="533400"/>
-            </a:xfrm>
-            <a:prstGeom prst="roundRect">
-              <a:avLst/>
-            </a:prstGeom>
-            <a:solidFill>
-              <a:schemeClr val="accent1">
-                <a:lumMod val="20000"/>
-                <a:lumOff val="80000"/>
-              </a:schemeClr>
-            </a:solidFill>
-          </p:spPr>
-          <p:style>
-            <a:lnRef idx="1">
-              <a:schemeClr val="accent1"/>
-            </a:lnRef>
-            <a:fillRef idx="2">
-              <a:schemeClr val="accent1"/>
-            </a:fillRef>
-            <a:effectRef idx="1">
-              <a:schemeClr val="accent1"/>
-            </a:effectRef>
-            <a:fontRef idx="minor">
-              <a:schemeClr val="dk1"/>
-            </a:fontRef>
-          </p:style>
-          <p:txBody>
-            <a:bodyPr rtlCol="0" anchor="ctr"/>
-            <a:lstStyle/>
-            <a:p>
-              <a:pPr algn="ctr"/>
-              <a:r>
-                <a:rPr lang="en-US" dirty="0" smtClean="0"/>
-                <a:t>Combine simpler functions</a:t>
-              </a:r>
-              <a:endParaRPr lang="en-US" dirty="0"/>
-            </a:p>
-          </p:txBody>
-        </p:sp>
-        <p:sp>
-          <p:nvSpPr>
-            <p:cNvPr id="23" name="Rounded Rectangle 22"/>
-            <p:cNvSpPr/>
-            <p:nvPr/>
-          </p:nvSpPr>
-          <p:spPr>
-            <a:xfrm>
-              <a:off x="2598691" y="2766140"/>
-              <a:ext cx="1828800" cy="533400"/>
-            </a:xfrm>
-            <a:prstGeom prst="roundRect">
-              <a:avLst/>
-            </a:prstGeom>
-            <a:solidFill>
-              <a:schemeClr val="accent1">
-                <a:lumMod val="20000"/>
-                <a:lumOff val="80000"/>
-              </a:schemeClr>
-            </a:solidFill>
-          </p:spPr>
-          <p:style>
-            <a:lnRef idx="1">
-              <a:schemeClr val="accent1"/>
-            </a:lnRef>
-            <a:fillRef idx="2">
-              <a:schemeClr val="accent1"/>
-            </a:fillRef>
-            <a:effectRef idx="1">
-              <a:schemeClr val="accent1"/>
-            </a:effectRef>
-            <a:fontRef idx="minor">
-              <a:schemeClr val="dk1"/>
-            </a:fontRef>
-          </p:style>
-          <p:txBody>
-            <a:bodyPr rtlCol="0" anchor="ctr"/>
-            <a:lstStyle/>
-            <a:p>
-              <a:pPr algn="ctr"/>
-              <a:r>
-                <a:rPr lang="en-US" dirty="0" smtClean="0"/>
-                <a:t>Use a template</a:t>
-              </a:r>
-              <a:endParaRPr lang="en-US" dirty="0"/>
-            </a:p>
-          </p:txBody>
-        </p:sp>
-        <p:sp>
-          <p:nvSpPr>
-            <p:cNvPr id="28" name="Rounded Rectangle 27"/>
-            <p:cNvSpPr/>
-            <p:nvPr/>
-          </p:nvSpPr>
-          <p:spPr>
-            <a:xfrm>
-              <a:off x="2598691" y="3774493"/>
-              <a:ext cx="1828800" cy="533400"/>
-            </a:xfrm>
-            <a:prstGeom prst="roundRect">
-              <a:avLst/>
-            </a:prstGeom>
-            <a:solidFill>
-              <a:schemeClr val="accent1">
-                <a:lumMod val="20000"/>
-                <a:lumOff val="80000"/>
-              </a:schemeClr>
-            </a:solidFill>
-          </p:spPr>
-          <p:style>
-            <a:lnRef idx="1">
-              <a:schemeClr val="accent1"/>
-            </a:lnRef>
-            <a:fillRef idx="2">
-              <a:schemeClr val="accent1"/>
-            </a:fillRef>
-            <a:effectRef idx="1">
-              <a:schemeClr val="accent1"/>
-            </a:effectRef>
-            <a:fontRef idx="minor">
-              <a:schemeClr val="dk1"/>
-            </a:fontRef>
-          </p:style>
-          <p:txBody>
-            <a:bodyPr rtlCol="0" anchor="ctr"/>
-            <a:lstStyle/>
-            <a:p>
-              <a:pPr algn="ctr"/>
-              <a:r>
-                <a:rPr lang="en-US" dirty="0" smtClean="0"/>
-                <a:t>Divide into Cases</a:t>
-              </a:r>
-              <a:endParaRPr lang="en-US" dirty="0"/>
-            </a:p>
-          </p:txBody>
-        </p:sp>
-        <p:sp>
-          <p:nvSpPr>
-            <p:cNvPr id="38" name="Rounded Rectangle 37"/>
-            <p:cNvSpPr/>
-            <p:nvPr/>
-          </p:nvSpPr>
-          <p:spPr>
-            <a:xfrm>
-              <a:off x="2598691" y="4782846"/>
-              <a:ext cx="1828800" cy="533400"/>
-            </a:xfrm>
-            <a:prstGeom prst="roundRect">
-              <a:avLst/>
-            </a:prstGeom>
-            <a:solidFill>
-              <a:schemeClr val="accent1">
-                <a:lumMod val="20000"/>
-                <a:lumOff val="80000"/>
-              </a:schemeClr>
-            </a:solidFill>
-          </p:spPr>
-          <p:style>
-            <a:lnRef idx="1">
-              <a:schemeClr val="accent1"/>
-            </a:lnRef>
-            <a:fillRef idx="2">
-              <a:schemeClr val="accent1"/>
-            </a:fillRef>
-            <a:effectRef idx="1">
-              <a:schemeClr val="accent1"/>
-            </a:effectRef>
-            <a:fontRef idx="minor">
-              <a:schemeClr val="dk1"/>
-            </a:fontRef>
-          </p:style>
-          <p:txBody>
-            <a:bodyPr rtlCol="0" anchor="ctr"/>
-            <a:lstStyle/>
-            <a:p>
-              <a:pPr algn="ctr"/>
-              <a:r>
-                <a:rPr lang="en-US" dirty="0" smtClean="0"/>
-                <a:t>Call a more general function</a:t>
-              </a:r>
-              <a:endParaRPr lang="en-US" dirty="0"/>
-            </a:p>
-          </p:txBody>
-        </p:sp>
-        <p:sp>
-          <p:nvSpPr>
-            <p:cNvPr id="48" name="Rounded Rectangle 47"/>
-            <p:cNvSpPr/>
-            <p:nvPr/>
-          </p:nvSpPr>
-          <p:spPr>
-            <a:xfrm>
-              <a:off x="2598691" y="5791200"/>
-              <a:ext cx="1828800" cy="533400"/>
-            </a:xfrm>
-            <a:prstGeom prst="roundRect">
-              <a:avLst/>
-            </a:prstGeom>
-            <a:solidFill>
-              <a:schemeClr val="accent1">
-                <a:lumMod val="20000"/>
-                <a:lumOff val="80000"/>
-              </a:schemeClr>
-            </a:solidFill>
-          </p:spPr>
-          <p:style>
-            <a:lnRef idx="1">
-              <a:schemeClr val="accent1"/>
-            </a:lnRef>
-            <a:fillRef idx="2">
-              <a:schemeClr val="accent1"/>
-            </a:fillRef>
-            <a:effectRef idx="1">
-              <a:schemeClr val="accent1"/>
-            </a:effectRef>
-            <a:fontRef idx="minor">
-              <a:schemeClr val="dk1"/>
-            </a:fontRef>
-          </p:style>
-          <p:txBody>
-            <a:bodyPr rtlCol="0" anchor="ctr"/>
-            <a:lstStyle/>
-            <a:p>
-              <a:pPr algn="ctr"/>
-              <a:r>
-                <a:rPr lang="en-US" dirty="0" smtClean="0"/>
-                <a:t>Communicate via State</a:t>
-              </a:r>
-              <a:endParaRPr lang="en-US" dirty="0"/>
-            </a:p>
-          </p:txBody>
-        </p:sp>
-        <p:cxnSp>
-          <p:nvCxnSpPr>
-            <p:cNvPr id="70" name="Straight Arrow Connector 69"/>
-            <p:cNvCxnSpPr>
-              <a:stCxn id="13" idx="2"/>
-              <a:endCxn id="23" idx="0"/>
-            </p:cNvCxnSpPr>
-            <p:nvPr/>
-          </p:nvCxnSpPr>
-          <p:spPr>
-            <a:xfrm>
-              <a:off x="3513091" y="2291187"/>
-              <a:ext cx="0" cy="474953"/>
-            </a:xfrm>
-            <a:prstGeom prst="straightConnector1">
-              <a:avLst/>
-            </a:prstGeom>
-            <a:ln>
-              <a:tailEnd type="triangle"/>
-            </a:ln>
-          </p:spPr>
-          <p:style>
-            <a:lnRef idx="1">
-              <a:schemeClr val="accent1"/>
-            </a:lnRef>
-            <a:fillRef idx="0">
-              <a:schemeClr val="accent1"/>
-            </a:fillRef>
-            <a:effectRef idx="0">
-              <a:schemeClr val="accent1"/>
-            </a:effectRef>
-            <a:fontRef idx="minor">
-              <a:schemeClr val="tx1"/>
-            </a:fontRef>
-          </p:style>
-        </p:cxnSp>
-        <p:cxnSp>
-          <p:nvCxnSpPr>
-            <p:cNvPr id="72" name="Straight Arrow Connector 71"/>
-            <p:cNvCxnSpPr>
-              <a:stCxn id="23" idx="2"/>
-              <a:endCxn id="28" idx="0"/>
-            </p:cNvCxnSpPr>
-            <p:nvPr/>
-          </p:nvCxnSpPr>
-          <p:spPr>
-            <a:xfrm>
-              <a:off x="3513091" y="3299540"/>
-              <a:ext cx="0" cy="474953"/>
-            </a:xfrm>
-            <a:prstGeom prst="straightConnector1">
-              <a:avLst/>
-            </a:prstGeom>
-            <a:ln>
-              <a:tailEnd type="triangle"/>
-            </a:ln>
-          </p:spPr>
-          <p:style>
-            <a:lnRef idx="1">
-              <a:schemeClr val="accent1"/>
-            </a:lnRef>
-            <a:fillRef idx="0">
-              <a:schemeClr val="accent1"/>
-            </a:fillRef>
-            <a:effectRef idx="0">
-              <a:schemeClr val="accent1"/>
-            </a:effectRef>
-            <a:fontRef idx="minor">
-              <a:schemeClr val="tx1"/>
-            </a:fontRef>
-          </p:style>
-        </p:cxnSp>
-        <p:cxnSp>
-          <p:nvCxnSpPr>
-            <p:cNvPr id="74" name="Straight Arrow Connector 73"/>
-            <p:cNvCxnSpPr>
-              <a:stCxn id="28" idx="2"/>
-              <a:endCxn id="38" idx="0"/>
-            </p:cNvCxnSpPr>
-            <p:nvPr/>
-          </p:nvCxnSpPr>
-          <p:spPr>
-            <a:xfrm>
-              <a:off x="3513091" y="4307893"/>
-              <a:ext cx="0" cy="474953"/>
-            </a:xfrm>
-            <a:prstGeom prst="straightConnector1">
-              <a:avLst/>
-            </a:prstGeom>
-            <a:ln>
-              <a:tailEnd type="triangle"/>
-            </a:ln>
-          </p:spPr>
-          <p:style>
-            <a:lnRef idx="1">
-              <a:schemeClr val="accent1"/>
-            </a:lnRef>
-            <a:fillRef idx="0">
-              <a:schemeClr val="accent1"/>
-            </a:fillRef>
-            <a:effectRef idx="0">
-              <a:schemeClr val="accent1"/>
-            </a:effectRef>
-            <a:fontRef idx="minor">
-              <a:schemeClr val="tx1"/>
-            </a:fontRef>
-          </p:style>
-        </p:cxnSp>
-        <p:cxnSp>
-          <p:nvCxnSpPr>
-            <p:cNvPr id="77" name="Straight Arrow Connector 76"/>
-            <p:cNvCxnSpPr>
-              <a:stCxn id="38" idx="2"/>
-              <a:endCxn id="48" idx="0"/>
-            </p:cNvCxnSpPr>
-            <p:nvPr/>
-          </p:nvCxnSpPr>
-          <p:spPr>
-            <a:xfrm>
-              <a:off x="3513091" y="5316246"/>
-              <a:ext cx="0" cy="474954"/>
-            </a:xfrm>
-            <a:prstGeom prst="straightConnector1">
-              <a:avLst/>
-            </a:prstGeom>
-            <a:ln>
-              <a:tailEnd type="triangle"/>
-            </a:ln>
-          </p:spPr>
-          <p:style>
-            <a:lnRef idx="1">
-              <a:schemeClr val="accent1"/>
-            </a:lnRef>
-            <a:fillRef idx="0">
-              <a:schemeClr val="accent1"/>
-            </a:fillRef>
-            <a:effectRef idx="0">
-              <a:schemeClr val="accent1"/>
-            </a:effectRef>
-            <a:fontRef idx="minor">
-              <a:schemeClr val="tx1"/>
-            </a:fontRef>
-          </p:style>
-        </p:cxnSp>
-      </p:grpSp>
       <p:cxnSp>
         <p:nvCxnSpPr>
           <p:cNvPr id="88" name="Straight Arrow Connector 87"/>
@@ -14262,8 +13815,8 @@
         </p:nvCxnSpPr>
         <p:spPr>
           <a:xfrm flipV="1">
-            <a:off x="5486400" y="2024487"/>
-            <a:ext cx="914400" cy="3025059"/>
+            <a:off x="5486398" y="2024487"/>
+            <a:ext cx="914402" cy="2410424"/>
           </a:xfrm>
           <a:prstGeom prst="bentConnector3">
             <a:avLst>
@@ -14312,6 +13865,535 @@
           </a:p>
         </p:txBody>
       </p:sp>
+      <p:grpSp>
+        <p:nvGrpSpPr>
+          <p:cNvPr id="24" name="Group 23"/>
+          <p:cNvGrpSpPr/>
+          <p:nvPr/>
+        </p:nvGrpSpPr>
+        <p:grpSpPr>
+          <a:xfrm>
+            <a:off x="3657598" y="941479"/>
+            <a:ext cx="1832811" cy="5373496"/>
+            <a:chOff x="3657598" y="941479"/>
+            <a:chExt cx="1832811" cy="5373496"/>
+          </a:xfrm>
+        </p:grpSpPr>
+        <p:sp>
+          <p:nvSpPr>
+            <p:cNvPr id="6" name="Rounded Rectangle 5"/>
+            <p:cNvSpPr/>
+            <p:nvPr/>
+          </p:nvSpPr>
+          <p:spPr>
+            <a:xfrm>
+              <a:off x="3657599" y="941479"/>
+              <a:ext cx="1828800" cy="533400"/>
+            </a:xfrm>
+            <a:prstGeom prst="roundRect">
+              <a:avLst/>
+            </a:prstGeom>
+          </p:spPr>
+          <p:style>
+            <a:lnRef idx="0">
+              <a:schemeClr val="accent1"/>
+            </a:lnRef>
+            <a:fillRef idx="3">
+              <a:schemeClr val="accent1"/>
+            </a:fillRef>
+            <a:effectRef idx="3">
+              <a:schemeClr val="accent1"/>
+            </a:effectRef>
+            <a:fontRef idx="minor">
+              <a:schemeClr val="lt1"/>
+            </a:fontRef>
+          </p:style>
+          <p:txBody>
+            <a:bodyPr rtlCol="0" anchor="ctr"/>
+            <a:lstStyle/>
+            <a:p>
+              <a:pPr algn="ctr"/>
+              <a:r>
+                <a:rPr lang="en-US" dirty="0" smtClean="0"/>
+                <a:t>Design Strategies</a:t>
+              </a:r>
+              <a:endParaRPr lang="en-US" dirty="0"/>
+            </a:p>
+          </p:txBody>
+        </p:sp>
+        <p:sp>
+          <p:nvSpPr>
+            <p:cNvPr id="13" name="Rounded Rectangle 12"/>
+            <p:cNvSpPr/>
+            <p:nvPr/>
+          </p:nvSpPr>
+          <p:spPr>
+            <a:xfrm>
+              <a:off x="3657599" y="1748162"/>
+              <a:ext cx="1828800" cy="533400"/>
+            </a:xfrm>
+            <a:prstGeom prst="roundRect">
+              <a:avLst/>
+            </a:prstGeom>
+            <a:solidFill>
+              <a:schemeClr val="accent1">
+                <a:lumMod val="20000"/>
+                <a:lumOff val="80000"/>
+              </a:schemeClr>
+            </a:solidFill>
+          </p:spPr>
+          <p:style>
+            <a:lnRef idx="1">
+              <a:schemeClr val="accent1"/>
+            </a:lnRef>
+            <a:fillRef idx="2">
+              <a:schemeClr val="accent1"/>
+            </a:fillRef>
+            <a:effectRef idx="1">
+              <a:schemeClr val="accent1"/>
+            </a:effectRef>
+            <a:fontRef idx="minor">
+              <a:schemeClr val="dk1"/>
+            </a:fontRef>
+          </p:style>
+          <p:txBody>
+            <a:bodyPr rtlCol="0" anchor="ctr"/>
+            <a:lstStyle/>
+            <a:p>
+              <a:pPr algn="ctr"/>
+              <a:r>
+                <a:rPr lang="en-US" dirty="0" smtClean="0"/>
+                <a:t>Combine simpler functions</a:t>
+              </a:r>
+              <a:endParaRPr lang="en-US" dirty="0"/>
+            </a:p>
+          </p:txBody>
+        </p:sp>
+        <p:sp>
+          <p:nvSpPr>
+            <p:cNvPr id="23" name="Rounded Rectangle 22"/>
+            <p:cNvSpPr/>
+            <p:nvPr/>
+          </p:nvSpPr>
+          <p:spPr>
+            <a:xfrm>
+              <a:off x="3660004" y="2554845"/>
+              <a:ext cx="1828800" cy="533400"/>
+            </a:xfrm>
+            <a:prstGeom prst="roundRect">
+              <a:avLst/>
+            </a:prstGeom>
+            <a:solidFill>
+              <a:schemeClr val="accent1">
+                <a:lumMod val="20000"/>
+                <a:lumOff val="80000"/>
+              </a:schemeClr>
+            </a:solidFill>
+          </p:spPr>
+          <p:style>
+            <a:lnRef idx="1">
+              <a:schemeClr val="accent1"/>
+            </a:lnRef>
+            <a:fillRef idx="2">
+              <a:schemeClr val="accent1"/>
+            </a:fillRef>
+            <a:effectRef idx="1">
+              <a:schemeClr val="accent1"/>
+            </a:effectRef>
+            <a:fontRef idx="minor">
+              <a:schemeClr val="dk1"/>
+            </a:fontRef>
+          </p:style>
+          <p:txBody>
+            <a:bodyPr rtlCol="0" anchor="ctr"/>
+            <a:lstStyle/>
+            <a:p>
+              <a:pPr algn="ctr"/>
+              <a:r>
+                <a:rPr lang="en-US" dirty="0" smtClean="0"/>
+                <a:t>Use a template</a:t>
+              </a:r>
+              <a:endParaRPr lang="en-US" dirty="0"/>
+            </a:p>
+          </p:txBody>
+        </p:sp>
+        <p:sp>
+          <p:nvSpPr>
+            <p:cNvPr id="28" name="Rounded Rectangle 27"/>
+            <p:cNvSpPr/>
+            <p:nvPr/>
+          </p:nvSpPr>
+          <p:spPr>
+            <a:xfrm>
+              <a:off x="3661609" y="3361528"/>
+              <a:ext cx="1828800" cy="533400"/>
+            </a:xfrm>
+            <a:prstGeom prst="roundRect">
+              <a:avLst/>
+            </a:prstGeom>
+            <a:solidFill>
+              <a:schemeClr val="accent1">
+                <a:lumMod val="20000"/>
+                <a:lumOff val="80000"/>
+              </a:schemeClr>
+            </a:solidFill>
+          </p:spPr>
+          <p:style>
+            <a:lnRef idx="1">
+              <a:schemeClr val="accent1"/>
+            </a:lnRef>
+            <a:fillRef idx="2">
+              <a:schemeClr val="accent1"/>
+            </a:fillRef>
+            <a:effectRef idx="1">
+              <a:schemeClr val="accent1"/>
+            </a:effectRef>
+            <a:fontRef idx="minor">
+              <a:schemeClr val="dk1"/>
+            </a:fontRef>
+          </p:style>
+          <p:txBody>
+            <a:bodyPr rtlCol="0" anchor="ctr"/>
+            <a:lstStyle/>
+            <a:p>
+              <a:pPr algn="ctr"/>
+              <a:r>
+                <a:rPr lang="en-US" dirty="0" smtClean="0"/>
+                <a:t>Divide into Cases</a:t>
+              </a:r>
+              <a:endParaRPr lang="en-US" dirty="0"/>
+            </a:p>
+          </p:txBody>
+        </p:sp>
+        <p:sp>
+          <p:nvSpPr>
+            <p:cNvPr id="38" name="Rounded Rectangle 37"/>
+            <p:cNvSpPr/>
+            <p:nvPr/>
+          </p:nvSpPr>
+          <p:spPr>
+            <a:xfrm>
+              <a:off x="3657598" y="4168211"/>
+              <a:ext cx="1828800" cy="533400"/>
+            </a:xfrm>
+            <a:prstGeom prst="roundRect">
+              <a:avLst/>
+            </a:prstGeom>
+            <a:solidFill>
+              <a:schemeClr val="accent1">
+                <a:lumMod val="20000"/>
+                <a:lumOff val="80000"/>
+              </a:schemeClr>
+            </a:solidFill>
+          </p:spPr>
+          <p:style>
+            <a:lnRef idx="1">
+              <a:schemeClr val="accent1"/>
+            </a:lnRef>
+            <a:fillRef idx="2">
+              <a:schemeClr val="accent1"/>
+            </a:fillRef>
+            <a:effectRef idx="1">
+              <a:schemeClr val="accent1"/>
+            </a:effectRef>
+            <a:fontRef idx="minor">
+              <a:schemeClr val="dk1"/>
+            </a:fontRef>
+          </p:style>
+          <p:txBody>
+            <a:bodyPr rtlCol="0" anchor="ctr"/>
+            <a:lstStyle/>
+            <a:p>
+              <a:pPr algn="ctr"/>
+              <a:r>
+                <a:rPr lang="en-US" dirty="0" smtClean="0"/>
+                <a:t>Call a more general function</a:t>
+              </a:r>
+              <a:endParaRPr lang="en-US" dirty="0"/>
+            </a:p>
+          </p:txBody>
+        </p:sp>
+        <p:sp>
+          <p:nvSpPr>
+            <p:cNvPr id="48" name="Rounded Rectangle 47"/>
+            <p:cNvSpPr/>
+            <p:nvPr/>
+          </p:nvSpPr>
+          <p:spPr>
+            <a:xfrm>
+              <a:off x="3657599" y="5781575"/>
+              <a:ext cx="1828800" cy="533400"/>
+            </a:xfrm>
+            <a:prstGeom prst="roundRect">
+              <a:avLst/>
+            </a:prstGeom>
+            <a:solidFill>
+              <a:schemeClr val="accent1">
+                <a:lumMod val="20000"/>
+                <a:lumOff val="80000"/>
+              </a:schemeClr>
+            </a:solidFill>
+          </p:spPr>
+          <p:style>
+            <a:lnRef idx="1">
+              <a:schemeClr val="accent1"/>
+            </a:lnRef>
+            <a:fillRef idx="2">
+              <a:schemeClr val="accent1"/>
+            </a:fillRef>
+            <a:effectRef idx="1">
+              <a:schemeClr val="accent1"/>
+            </a:effectRef>
+            <a:fontRef idx="minor">
+              <a:schemeClr val="dk1"/>
+            </a:fontRef>
+          </p:style>
+          <p:txBody>
+            <a:bodyPr rtlCol="0" anchor="ctr"/>
+            <a:lstStyle/>
+            <a:p>
+              <a:pPr algn="ctr"/>
+              <a:r>
+                <a:rPr lang="en-US" dirty="0" smtClean="0"/>
+                <a:t>Communicate via State</a:t>
+              </a:r>
+              <a:endParaRPr lang="en-US" dirty="0"/>
+            </a:p>
+          </p:txBody>
+        </p:sp>
+        <p:cxnSp>
+          <p:nvCxnSpPr>
+            <p:cNvPr id="70" name="Straight Arrow Connector 69"/>
+            <p:cNvCxnSpPr>
+              <a:stCxn id="13" idx="2"/>
+              <a:endCxn id="23" idx="0"/>
+            </p:cNvCxnSpPr>
+            <p:nvPr/>
+          </p:nvCxnSpPr>
+          <p:spPr>
+            <a:xfrm>
+              <a:off x="4571999" y="2281562"/>
+              <a:ext cx="2405" cy="273283"/>
+            </a:xfrm>
+            <a:prstGeom prst="straightConnector1">
+              <a:avLst/>
+            </a:prstGeom>
+            <a:ln>
+              <a:tailEnd type="triangle"/>
+            </a:ln>
+          </p:spPr>
+          <p:style>
+            <a:lnRef idx="1">
+              <a:schemeClr val="accent1"/>
+            </a:lnRef>
+            <a:fillRef idx="0">
+              <a:schemeClr val="accent1"/>
+            </a:fillRef>
+            <a:effectRef idx="0">
+              <a:schemeClr val="accent1"/>
+            </a:effectRef>
+            <a:fontRef idx="minor">
+              <a:schemeClr val="tx1"/>
+            </a:fontRef>
+          </p:style>
+        </p:cxnSp>
+        <p:cxnSp>
+          <p:nvCxnSpPr>
+            <p:cNvPr id="72" name="Straight Arrow Connector 71"/>
+            <p:cNvCxnSpPr>
+              <a:stCxn id="23" idx="2"/>
+              <a:endCxn id="28" idx="0"/>
+            </p:cNvCxnSpPr>
+            <p:nvPr/>
+          </p:nvCxnSpPr>
+          <p:spPr>
+            <a:xfrm>
+              <a:off x="4574404" y="3088245"/>
+              <a:ext cx="1605" cy="273283"/>
+            </a:xfrm>
+            <a:prstGeom prst="straightConnector1">
+              <a:avLst/>
+            </a:prstGeom>
+            <a:ln>
+              <a:tailEnd type="triangle"/>
+            </a:ln>
+          </p:spPr>
+          <p:style>
+            <a:lnRef idx="1">
+              <a:schemeClr val="accent1"/>
+            </a:lnRef>
+            <a:fillRef idx="0">
+              <a:schemeClr val="accent1"/>
+            </a:fillRef>
+            <a:effectRef idx="0">
+              <a:schemeClr val="accent1"/>
+            </a:effectRef>
+            <a:fontRef idx="minor">
+              <a:schemeClr val="tx1"/>
+            </a:fontRef>
+          </p:style>
+        </p:cxnSp>
+        <p:cxnSp>
+          <p:nvCxnSpPr>
+            <p:cNvPr id="74" name="Straight Arrow Connector 73"/>
+            <p:cNvCxnSpPr>
+              <a:stCxn id="28" idx="2"/>
+              <a:endCxn id="38" idx="0"/>
+            </p:cNvCxnSpPr>
+            <p:nvPr/>
+          </p:nvCxnSpPr>
+          <p:spPr>
+            <a:xfrm flipH="1">
+              <a:off x="4571998" y="3894928"/>
+              <a:ext cx="4011" cy="273283"/>
+            </a:xfrm>
+            <a:prstGeom prst="straightConnector1">
+              <a:avLst/>
+            </a:prstGeom>
+            <a:ln>
+              <a:tailEnd type="triangle"/>
+            </a:ln>
+          </p:spPr>
+          <p:style>
+            <a:lnRef idx="1">
+              <a:schemeClr val="accent1"/>
+            </a:lnRef>
+            <a:fillRef idx="0">
+              <a:schemeClr val="accent1"/>
+            </a:fillRef>
+            <a:effectRef idx="0">
+              <a:schemeClr val="accent1"/>
+            </a:effectRef>
+            <a:fontRef idx="minor">
+              <a:schemeClr val="tx1"/>
+            </a:fontRef>
+          </p:style>
+        </p:cxnSp>
+        <p:cxnSp>
+          <p:nvCxnSpPr>
+            <p:cNvPr id="77" name="Straight Arrow Connector 76"/>
+            <p:cNvCxnSpPr>
+              <a:stCxn id="38" idx="2"/>
+              <a:endCxn id="43" idx="0"/>
+            </p:cNvCxnSpPr>
+            <p:nvPr/>
+          </p:nvCxnSpPr>
+          <p:spPr>
+            <a:xfrm>
+              <a:off x="4571998" y="4701611"/>
+              <a:ext cx="0" cy="273283"/>
+            </a:xfrm>
+            <a:prstGeom prst="straightConnector1">
+              <a:avLst/>
+            </a:prstGeom>
+            <a:ln>
+              <a:tailEnd type="triangle"/>
+            </a:ln>
+          </p:spPr>
+          <p:style>
+            <a:lnRef idx="1">
+              <a:schemeClr val="accent1"/>
+            </a:lnRef>
+            <a:fillRef idx="0">
+              <a:schemeClr val="accent1"/>
+            </a:fillRef>
+            <a:effectRef idx="0">
+              <a:schemeClr val="accent1"/>
+            </a:effectRef>
+            <a:fontRef idx="minor">
+              <a:schemeClr val="tx1"/>
+            </a:fontRef>
+          </p:style>
+        </p:cxnSp>
+        <p:sp>
+          <p:nvSpPr>
+            <p:cNvPr id="43" name="Rounded Rectangle 42"/>
+            <p:cNvSpPr/>
+            <p:nvPr/>
+          </p:nvSpPr>
+          <p:spPr>
+            <a:xfrm>
+              <a:off x="3657598" y="4974894"/>
+              <a:ext cx="1828800" cy="533400"/>
+            </a:xfrm>
+            <a:prstGeom prst="roundRect">
+              <a:avLst/>
+            </a:prstGeom>
+            <a:solidFill>
+              <a:schemeClr val="accent1">
+                <a:lumMod val="20000"/>
+                <a:lumOff val="80000"/>
+              </a:schemeClr>
+            </a:solidFill>
+          </p:spPr>
+          <p:style>
+            <a:lnRef idx="1">
+              <a:schemeClr val="accent1"/>
+            </a:lnRef>
+            <a:fillRef idx="2">
+              <a:schemeClr val="accent1"/>
+            </a:fillRef>
+            <a:effectRef idx="1">
+              <a:schemeClr val="accent1"/>
+            </a:effectRef>
+            <a:fontRef idx="minor">
+              <a:schemeClr val="dk1"/>
+            </a:fontRef>
+          </p:style>
+          <p:txBody>
+            <a:bodyPr rtlCol="0" anchor="ctr"/>
+            <a:lstStyle/>
+            <a:p>
+              <a:pPr algn="ctr"/>
+              <a:r>
+                <a:rPr lang="en-US" dirty="0" smtClean="0"/>
+                <a:t>Recur on </a:t>
+              </a:r>
+              <a:r>
+                <a:rPr lang="en-US" dirty="0" err="1" smtClean="0"/>
+                <a:t>subproblem</a:t>
+              </a:r>
+              <a:endParaRPr lang="en-US" dirty="0"/>
+            </a:p>
+          </p:txBody>
+        </p:sp>
+      </p:grpSp>
+      <p:cxnSp>
+        <p:nvCxnSpPr>
+          <p:cNvPr id="51" name="Straight Arrow Connector 50"/>
+          <p:cNvCxnSpPr>
+            <a:stCxn id="43" idx="2"/>
+            <a:endCxn id="48" idx="0"/>
+          </p:cNvCxnSpPr>
+          <p:nvPr/>
+        </p:nvCxnSpPr>
+        <p:spPr>
+          <a:xfrm>
+            <a:off x="4571998" y="5508294"/>
+            <a:ext cx="1" cy="273281"/>
+          </a:xfrm>
+          <a:prstGeom prst="straightConnector1">
+            <a:avLst/>
+          </a:prstGeom>
+          <a:ln>
+            <a:tailEnd type="triangle"/>
+          </a:ln>
+        </p:spPr>
+        <p:style>
+          <a:lnRef idx="1">
+            <a:schemeClr val="accent1"/>
+          </a:lnRef>
+          <a:fillRef idx="0">
+            <a:schemeClr val="accent1"/>
+          </a:fillRef>
+          <a:effectRef idx="0">
+            <a:schemeClr val="accent1"/>
+          </a:effectRef>
+          <a:fontRef idx="minor">
+            <a:schemeClr val="tx1"/>
+          </a:fontRef>
+        </p:style>
+      </p:cxnSp>
     </p:spTree>
     <p:extLst>
       <p:ext uri="{BB962C8B-B14F-4D97-AF65-F5344CB8AC3E}">

</xml_diff>

<commit_message>
added class notes for module 06
</commit_message>
<xml_diff>
--- a/Slides/Common Slides for CS 5010.pptx
+++ b/Slides/Common Slides for CS 5010.pptx
@@ -240,7 +240,7 @@
           <a:p>
             <a:fld id="{03B24962-D7B5-4FEA-ABE9-8C89DFE85AA1}" type="datetimeFigureOut">
               <a:rPr lang="en-US" smtClean="0"/>
-              <a:t>10/19/2015</a:t>
+              <a:t>10/22/2015</a:t>
             </a:fld>
             <a:endParaRPr lang="en-US"/>
           </a:p>
@@ -1917,7 +1917,7 @@
           <a:p>
             <a:fld id="{2F1F79F5-7BEC-496A-AFC7-876E38F64D71}" type="datetime1">
               <a:rPr lang="en-US" smtClean="0"/>
-              <a:t>10/19/2015</a:t>
+              <a:t>10/22/2015</a:t>
             </a:fld>
             <a:endParaRPr lang="en-US"/>
           </a:p>
@@ -1986,6 +1986,131 @@
 </file>
 
 <file path=ppt/slideLayouts/slideLayout10.xml><?xml version="1.0" encoding="utf-8"?>
+<p:sldLayout xmlns:a="http://schemas.openxmlformats.org/drawingml/2006/main" xmlns:r="http://schemas.openxmlformats.org/officeDocument/2006/relationships" xmlns:p="http://schemas.openxmlformats.org/presentationml/2006/main" type="titleOnly" preserve="1">
+  <p:cSld name="Title Only">
+    <p:spTree>
+      <p:nvGrpSpPr>
+        <p:cNvPr id="1" name=""/>
+        <p:cNvGrpSpPr/>
+        <p:nvPr/>
+      </p:nvGrpSpPr>
+      <p:grpSpPr>
+        <a:xfrm>
+          <a:off x="0" y="0"/>
+          <a:ext cx="0" cy="0"/>
+          <a:chOff x="0" y="0"/>
+          <a:chExt cx="0" cy="0"/>
+        </a:xfrm>
+      </p:grpSpPr>
+      <p:sp>
+        <p:nvSpPr>
+          <p:cNvPr id="2" name="Title 1"/>
+          <p:cNvSpPr>
+            <a:spLocks noGrp="1"/>
+          </p:cNvSpPr>
+          <p:nvPr>
+            <p:ph type="title"/>
+          </p:nvPr>
+        </p:nvSpPr>
+        <p:spPr/>
+        <p:txBody>
+          <a:bodyPr/>
+          <a:lstStyle/>
+          <a:p>
+            <a:r>
+              <a:rPr lang="en-US" smtClean="0"/>
+              <a:t>Click to edit Master title style</a:t>
+            </a:r>
+            <a:endParaRPr lang="en-US"/>
+          </a:p>
+        </p:txBody>
+      </p:sp>
+      <p:sp>
+        <p:nvSpPr>
+          <p:cNvPr id="3" name="Date Placeholder 2"/>
+          <p:cNvSpPr>
+            <a:spLocks noGrp="1"/>
+          </p:cNvSpPr>
+          <p:nvPr>
+            <p:ph type="dt" sz="half" idx="10"/>
+          </p:nvPr>
+        </p:nvSpPr>
+        <p:spPr/>
+        <p:txBody>
+          <a:bodyPr/>
+          <a:lstStyle/>
+          <a:p>
+            <a:fld id="{2F7B77F5-1464-4F6B-92A8-64FC8A508293}" type="datetime1">
+              <a:rPr lang="en-US" smtClean="0"/>
+              <a:t>10/22/2015</a:t>
+            </a:fld>
+            <a:endParaRPr lang="en-US"/>
+          </a:p>
+        </p:txBody>
+      </p:sp>
+      <p:sp>
+        <p:nvSpPr>
+          <p:cNvPr id="4" name="Footer Placeholder 3"/>
+          <p:cNvSpPr>
+            <a:spLocks noGrp="1"/>
+          </p:cNvSpPr>
+          <p:nvPr>
+            <p:ph type="ftr" sz="quarter" idx="11"/>
+          </p:nvPr>
+        </p:nvSpPr>
+        <p:spPr/>
+        <p:txBody>
+          <a:bodyPr/>
+          <a:lstStyle/>
+          <a:p>
+            <a:endParaRPr lang="en-US"/>
+          </a:p>
+        </p:txBody>
+      </p:sp>
+      <p:sp>
+        <p:nvSpPr>
+          <p:cNvPr id="5" name="Slide Number Placeholder 4"/>
+          <p:cNvSpPr>
+            <a:spLocks noGrp="1"/>
+          </p:cNvSpPr>
+          <p:nvPr>
+            <p:ph type="sldNum" sz="quarter" idx="12"/>
+          </p:nvPr>
+        </p:nvSpPr>
+        <p:spPr/>
+        <p:txBody>
+          <a:bodyPr/>
+          <a:lstStyle/>
+          <a:p>
+            <a:fld id="{2AF3B5EA-18B6-4040-9F78-6052AF49C681}" type="slidenum">
+              <a:rPr lang="en-US" smtClean="0"/>
+              <a:t>‹#›</a:t>
+            </a:fld>
+            <a:endParaRPr lang="en-US"/>
+          </a:p>
+        </p:txBody>
+      </p:sp>
+    </p:spTree>
+    <p:extLst>
+      <p:ext uri="{BB962C8B-B14F-4D97-AF65-F5344CB8AC3E}">
+        <p14:creationId xmlns:p14="http://schemas.microsoft.com/office/powerpoint/2010/main" val="3754008708"/>
+      </p:ext>
+    </p:extLst>
+  </p:cSld>
+  <p:clrMapOvr>
+    <a:masterClrMapping/>
+  </p:clrMapOvr>
+  <p:timing>
+    <p:tnLst>
+      <p:par>
+        <p:cTn id="1" dur="indefinite" restart="never" nodeType="tmRoot"/>
+      </p:par>
+    </p:tnLst>
+  </p:timing>
+</p:sldLayout>
+</file>
+
+<file path=ppt/slideLayouts/slideLayout11.xml><?xml version="1.0" encoding="utf-8"?>
 <p:sldLayout xmlns:a="http://schemas.openxmlformats.org/drawingml/2006/main" xmlns:r="http://schemas.openxmlformats.org/officeDocument/2006/relationships" xmlns:p="http://schemas.openxmlformats.org/presentationml/2006/main" type="blank" preserve="1">
   <p:cSld name="Blank">
     <p:spTree>
@@ -2019,7 +2144,7 @@
           <a:p>
             <a:fld id="{0A05703A-7669-4FEA-9056-25299B4D29D4}" type="datetime1">
               <a:rPr lang="en-US" smtClean="0"/>
-              <a:t>10/19/2015</a:t>
+              <a:t>10/22/2015</a:t>
             </a:fld>
             <a:endParaRPr lang="en-US"/>
           </a:p>
@@ -2080,7 +2205,7 @@
 </p:sldLayout>
 </file>
 
-<file path=ppt/slideLayouts/slideLayout11.xml><?xml version="1.0" encoding="utf-8"?>
+<file path=ppt/slideLayouts/slideLayout12.xml><?xml version="1.0" encoding="utf-8"?>
 <p:sldLayout xmlns:a="http://schemas.openxmlformats.org/drawingml/2006/main" xmlns:r="http://schemas.openxmlformats.org/officeDocument/2006/relationships" xmlns:p="http://schemas.openxmlformats.org/presentationml/2006/main" type="objTx" preserve="1">
   <p:cSld name="Content with Caption">
     <p:spTree>
@@ -2296,7 +2421,7 @@
           <a:p>
             <a:fld id="{6E5077B5-BB57-49DB-88CA-226A139E5C01}" type="datetime1">
               <a:rPr lang="en-US" smtClean="0"/>
-              <a:t>10/19/2015</a:t>
+              <a:t>10/22/2015</a:t>
             </a:fld>
             <a:endParaRPr lang="en-US"/>
           </a:p>
@@ -2357,7 +2482,7 @@
 </p:sldLayout>
 </file>
 
-<file path=ppt/slideLayouts/slideLayout12.xml><?xml version="1.0" encoding="utf-8"?>
+<file path=ppt/slideLayouts/slideLayout13.xml><?xml version="1.0" encoding="utf-8"?>
 <p:sldLayout xmlns:a="http://schemas.openxmlformats.org/drawingml/2006/main" xmlns:r="http://schemas.openxmlformats.org/officeDocument/2006/relationships" xmlns:p="http://schemas.openxmlformats.org/presentationml/2006/main" type="picTx" preserve="1">
   <p:cSld name="Picture with Caption">
     <p:spTree>
@@ -2549,7 +2674,7 @@
           <a:p>
             <a:fld id="{C48D9447-CBD6-49A1-89FD-8512A8CF8999}" type="datetime1">
               <a:rPr lang="en-US" smtClean="0"/>
-              <a:t>10/19/2015</a:t>
+              <a:t>10/22/2015</a:t>
             </a:fld>
             <a:endParaRPr lang="en-US"/>
           </a:p>
@@ -2610,7 +2735,7 @@
 </p:sldLayout>
 </file>
 
-<file path=ppt/slideLayouts/slideLayout13.xml><?xml version="1.0" encoding="utf-8"?>
+<file path=ppt/slideLayouts/slideLayout14.xml><?xml version="1.0" encoding="utf-8"?>
 <p:sldLayout xmlns:a="http://schemas.openxmlformats.org/drawingml/2006/main" xmlns:r="http://schemas.openxmlformats.org/officeDocument/2006/relationships" xmlns:p="http://schemas.openxmlformats.org/presentationml/2006/main" type="vertTx" preserve="1">
   <p:cSld name="Title and Vertical Text">
     <p:spTree>
@@ -2719,7 +2844,7 @@
           <a:p>
             <a:fld id="{A3639A2A-823D-48B7-9ACE-7FAF42870BA9}" type="datetime1">
               <a:rPr lang="en-US" smtClean="0"/>
-              <a:t>10/19/2015</a:t>
+              <a:t>10/22/2015</a:t>
             </a:fld>
             <a:endParaRPr lang="en-US"/>
           </a:p>
@@ -2780,7 +2905,7 @@
 </p:sldLayout>
 </file>
 
-<file path=ppt/slideLayouts/slideLayout14.xml><?xml version="1.0" encoding="utf-8"?>
+<file path=ppt/slideLayouts/slideLayout15.xml><?xml version="1.0" encoding="utf-8"?>
 <p:sldLayout xmlns:a="http://schemas.openxmlformats.org/drawingml/2006/main" xmlns:r="http://schemas.openxmlformats.org/officeDocument/2006/relationships" xmlns:p="http://schemas.openxmlformats.org/presentationml/2006/main" type="vertTitleAndTx" preserve="1">
   <p:cSld name="Vertical Title and Text">
     <p:spTree>
@@ -2899,7 +3024,7 @@
           <a:p>
             <a:fld id="{ED1B6996-82E9-463C-972C-7B56056E426C}" type="datetime1">
               <a:rPr lang="en-US" smtClean="0"/>
-              <a:t>10/19/2015</a:t>
+              <a:t>10/22/2015</a:t>
             </a:fld>
             <a:endParaRPr lang="en-US"/>
           </a:p>
@@ -3075,7 +3200,7 @@
           <a:p>
             <a:fld id="{E22ED4DA-448D-4BB1-B935-CC112220207B}" type="datetime1">
               <a:rPr lang="en-US" smtClean="0"/>
-              <a:t>10/19/2015</a:t>
+              <a:t>10/22/2015</a:t>
             </a:fld>
             <a:endParaRPr lang="en-US"/>
           </a:p>
@@ -3257,7 +3382,7 @@
           <a:p>
             <a:fld id="{E22ED4DA-448D-4BB1-B935-CC112220207B}" type="datetime1">
               <a:rPr lang="en-US" smtClean="0"/>
-              <a:t>10/19/2015</a:t>
+              <a:t>10/22/2015</a:t>
             </a:fld>
             <a:endParaRPr lang="en-US"/>
           </a:p>
@@ -3526,7 +3651,7 @@
           <a:p>
             <a:fld id="{FF5D65A6-AB94-4435-B0B7-3743215FA46C}" type="datetime1">
               <a:rPr lang="en-US" smtClean="0"/>
-              <a:t>10/19/2015</a:t>
+              <a:t>10/22/2015</a:t>
             </a:fld>
             <a:endParaRPr lang="en-US"/>
           </a:p>
@@ -3711,7 +3836,7 @@
           <a:p>
             <a:fld id="{FF5D65A6-AB94-4435-B0B7-3743215FA46C}" type="datetime1">
               <a:rPr lang="en-US" smtClean="0"/>
-              <a:t>10/19/2015</a:t>
+              <a:t>10/22/2015</a:t>
             </a:fld>
             <a:endParaRPr lang="en-US"/>
           </a:p>
@@ -4013,7 +4138,7 @@
           <a:p>
             <a:fld id="{7C193DC4-6EF0-48C9-B29C-616106A645E1}" type="datetime1">
               <a:rPr lang="en-US" smtClean="0"/>
-              <a:t>10/19/2015</a:t>
+              <a:t>10/22/2015</a:t>
             </a:fld>
             <a:endParaRPr lang="en-US"/>
           </a:p>
@@ -4301,7 +4426,7 @@
           <a:p>
             <a:fld id="{5D1846AD-9252-4647-9435-4C2AC365653A}" type="datetime1">
               <a:rPr lang="en-US" smtClean="0"/>
-              <a:t>10/19/2015</a:t>
+              <a:t>10/22/2015</a:t>
             </a:fld>
             <a:endParaRPr lang="en-US"/>
           </a:p>
@@ -4363,6 +4488,302 @@
 </file>
 
 <file path=ppt/slideLayouts/slideLayout8.xml><?xml version="1.0" encoding="utf-8"?>
+<p:sldLayout xmlns:a="http://schemas.openxmlformats.org/drawingml/2006/main" xmlns:r="http://schemas.openxmlformats.org/officeDocument/2006/relationships" xmlns:p="http://schemas.openxmlformats.org/presentationml/2006/main" type="twoObj" preserve="1">
+  <p:cSld name="Code_two_columns">
+    <p:spTree>
+      <p:nvGrpSpPr>
+        <p:cNvPr id="1" name=""/>
+        <p:cNvGrpSpPr/>
+        <p:nvPr/>
+      </p:nvGrpSpPr>
+      <p:grpSpPr>
+        <a:xfrm>
+          <a:off x="0" y="0"/>
+          <a:ext cx="0" cy="0"/>
+          <a:chOff x="0" y="0"/>
+          <a:chExt cx="0" cy="0"/>
+        </a:xfrm>
+      </p:grpSpPr>
+      <p:sp>
+        <p:nvSpPr>
+          <p:cNvPr id="2" name="Title 1"/>
+          <p:cNvSpPr>
+            <a:spLocks noGrp="1"/>
+          </p:cNvSpPr>
+          <p:nvPr>
+            <p:ph type="title"/>
+          </p:nvPr>
+        </p:nvSpPr>
+        <p:spPr/>
+        <p:txBody>
+          <a:bodyPr/>
+          <a:lstStyle/>
+          <a:p>
+            <a:r>
+              <a:rPr lang="en-US" smtClean="0"/>
+              <a:t>Click to edit Master title style</a:t>
+            </a:r>
+            <a:endParaRPr lang="en-US"/>
+          </a:p>
+        </p:txBody>
+      </p:sp>
+      <p:sp>
+        <p:nvSpPr>
+          <p:cNvPr id="3" name="Content Placeholder 2"/>
+          <p:cNvSpPr>
+            <a:spLocks noGrp="1"/>
+          </p:cNvSpPr>
+          <p:nvPr>
+            <p:ph sz="half" idx="1"/>
+          </p:nvPr>
+        </p:nvSpPr>
+        <p:spPr>
+          <a:xfrm>
+            <a:off x="457200" y="1600200"/>
+            <a:ext cx="4038600" cy="4525963"/>
+          </a:xfrm>
+        </p:spPr>
+        <p:txBody>
+          <a:bodyPr/>
+          <a:lstStyle>
+            <a:lvl1pPr marL="0" indent="0">
+              <a:buNone/>
+              <a:defRPr sz="2400" b="1">
+                <a:latin typeface="Consolas" panose="020B0609020204030204" pitchFamily="49" charset="0"/>
+                <a:cs typeface="Consolas" panose="020B0609020204030204" pitchFamily="49" charset="0"/>
+              </a:defRPr>
+            </a:lvl1pPr>
+            <a:lvl2pPr>
+              <a:defRPr sz="2400"/>
+            </a:lvl2pPr>
+            <a:lvl3pPr>
+              <a:defRPr sz="2000"/>
+            </a:lvl3pPr>
+            <a:lvl4pPr>
+              <a:defRPr sz="1800"/>
+            </a:lvl4pPr>
+            <a:lvl5pPr>
+              <a:defRPr sz="1800"/>
+            </a:lvl5pPr>
+            <a:lvl6pPr>
+              <a:defRPr sz="1800"/>
+            </a:lvl6pPr>
+            <a:lvl7pPr>
+              <a:defRPr sz="1800"/>
+            </a:lvl7pPr>
+            <a:lvl8pPr>
+              <a:defRPr sz="1800"/>
+            </a:lvl8pPr>
+            <a:lvl9pPr>
+              <a:defRPr sz="1800"/>
+            </a:lvl9pPr>
+          </a:lstStyle>
+          <a:p>
+            <a:pPr lvl="0"/>
+            <a:r>
+              <a:rPr lang="en-US" dirty="0" smtClean="0"/>
+              <a:t>Click to edit Master text styles</a:t>
+            </a:r>
+          </a:p>
+          <a:p>
+            <a:pPr lvl="1"/>
+            <a:r>
+              <a:rPr lang="en-US" dirty="0" smtClean="0"/>
+              <a:t>Second level</a:t>
+            </a:r>
+          </a:p>
+          <a:p>
+            <a:pPr lvl="2"/>
+            <a:r>
+              <a:rPr lang="en-US" dirty="0" smtClean="0"/>
+              <a:t>Third level</a:t>
+            </a:r>
+          </a:p>
+          <a:p>
+            <a:pPr lvl="3"/>
+            <a:r>
+              <a:rPr lang="en-US" dirty="0" smtClean="0"/>
+              <a:t>Fourth level</a:t>
+            </a:r>
+          </a:p>
+          <a:p>
+            <a:pPr lvl="4"/>
+            <a:r>
+              <a:rPr lang="en-US" dirty="0" smtClean="0"/>
+              <a:t>Fifth level</a:t>
+            </a:r>
+            <a:endParaRPr lang="en-US" dirty="0"/>
+          </a:p>
+        </p:txBody>
+      </p:sp>
+      <p:sp>
+        <p:nvSpPr>
+          <p:cNvPr id="4" name="Content Placeholder 3"/>
+          <p:cNvSpPr>
+            <a:spLocks noGrp="1"/>
+          </p:cNvSpPr>
+          <p:nvPr>
+            <p:ph sz="half" idx="2"/>
+          </p:nvPr>
+        </p:nvSpPr>
+        <p:spPr>
+          <a:xfrm>
+            <a:off x="4648200" y="1600200"/>
+            <a:ext cx="4038600" cy="4525963"/>
+          </a:xfrm>
+        </p:spPr>
+        <p:txBody>
+          <a:bodyPr/>
+          <a:lstStyle>
+            <a:lvl1pPr marL="0" indent="0">
+              <a:buNone/>
+              <a:defRPr sz="2400" b="1">
+                <a:latin typeface="Consolas" panose="020B0609020204030204" pitchFamily="49" charset="0"/>
+                <a:cs typeface="Consolas" panose="020B0609020204030204" pitchFamily="49" charset="0"/>
+              </a:defRPr>
+            </a:lvl1pPr>
+            <a:lvl2pPr>
+              <a:defRPr sz="2400"/>
+            </a:lvl2pPr>
+            <a:lvl3pPr>
+              <a:defRPr sz="2000"/>
+            </a:lvl3pPr>
+            <a:lvl4pPr>
+              <a:defRPr sz="1800"/>
+            </a:lvl4pPr>
+            <a:lvl5pPr>
+              <a:defRPr sz="1800"/>
+            </a:lvl5pPr>
+            <a:lvl6pPr>
+              <a:defRPr sz="1800"/>
+            </a:lvl6pPr>
+            <a:lvl7pPr>
+              <a:defRPr sz="1800"/>
+            </a:lvl7pPr>
+            <a:lvl8pPr>
+              <a:defRPr sz="1800"/>
+            </a:lvl8pPr>
+            <a:lvl9pPr>
+              <a:defRPr sz="1800"/>
+            </a:lvl9pPr>
+          </a:lstStyle>
+          <a:p>
+            <a:pPr lvl="0"/>
+            <a:r>
+              <a:rPr lang="en-US" dirty="0" smtClean="0"/>
+              <a:t>Click to edit Master text styles</a:t>
+            </a:r>
+          </a:p>
+          <a:p>
+            <a:pPr lvl="1"/>
+            <a:r>
+              <a:rPr lang="en-US" dirty="0" smtClean="0"/>
+              <a:t>Second level</a:t>
+            </a:r>
+          </a:p>
+          <a:p>
+            <a:pPr lvl="2"/>
+            <a:r>
+              <a:rPr lang="en-US" dirty="0" smtClean="0"/>
+              <a:t>Third level</a:t>
+            </a:r>
+          </a:p>
+          <a:p>
+            <a:pPr lvl="3"/>
+            <a:r>
+              <a:rPr lang="en-US" dirty="0" smtClean="0"/>
+              <a:t>Fourth level</a:t>
+            </a:r>
+          </a:p>
+          <a:p>
+            <a:pPr lvl="4"/>
+            <a:r>
+              <a:rPr lang="en-US" dirty="0" smtClean="0"/>
+              <a:t>Fifth level</a:t>
+            </a:r>
+            <a:endParaRPr lang="en-US" dirty="0"/>
+          </a:p>
+        </p:txBody>
+      </p:sp>
+      <p:sp>
+        <p:nvSpPr>
+          <p:cNvPr id="5" name="Date Placeholder 4"/>
+          <p:cNvSpPr>
+            <a:spLocks noGrp="1"/>
+          </p:cNvSpPr>
+          <p:nvPr>
+            <p:ph type="dt" sz="half" idx="10"/>
+          </p:nvPr>
+        </p:nvSpPr>
+        <p:spPr/>
+        <p:txBody>
+          <a:bodyPr/>
+          <a:lstStyle/>
+          <a:p>
+            <a:fld id="{5D1846AD-9252-4647-9435-4C2AC365653A}" type="datetime1">
+              <a:rPr lang="en-US" smtClean="0"/>
+              <a:t>10/22/2015</a:t>
+            </a:fld>
+            <a:endParaRPr lang="en-US"/>
+          </a:p>
+        </p:txBody>
+      </p:sp>
+      <p:sp>
+        <p:nvSpPr>
+          <p:cNvPr id="6" name="Footer Placeholder 5"/>
+          <p:cNvSpPr>
+            <a:spLocks noGrp="1"/>
+          </p:cNvSpPr>
+          <p:nvPr>
+            <p:ph type="ftr" sz="quarter" idx="11"/>
+          </p:nvPr>
+        </p:nvSpPr>
+        <p:spPr/>
+        <p:txBody>
+          <a:bodyPr/>
+          <a:lstStyle/>
+          <a:p>
+            <a:endParaRPr lang="en-US"/>
+          </a:p>
+        </p:txBody>
+      </p:sp>
+      <p:sp>
+        <p:nvSpPr>
+          <p:cNvPr id="7" name="Slide Number Placeholder 6"/>
+          <p:cNvSpPr>
+            <a:spLocks noGrp="1"/>
+          </p:cNvSpPr>
+          <p:nvPr>
+            <p:ph type="sldNum" sz="quarter" idx="12"/>
+          </p:nvPr>
+        </p:nvSpPr>
+        <p:spPr/>
+        <p:txBody>
+          <a:bodyPr/>
+          <a:lstStyle/>
+          <a:p>
+            <a:fld id="{2AF3B5EA-18B6-4040-9F78-6052AF49C681}" type="slidenum">
+              <a:rPr lang="en-US" smtClean="0"/>
+              <a:t>‹#›</a:t>
+            </a:fld>
+            <a:endParaRPr lang="en-US"/>
+          </a:p>
+        </p:txBody>
+      </p:sp>
+    </p:spTree>
+    <p:extLst>
+      <p:ext uri="{BB962C8B-B14F-4D97-AF65-F5344CB8AC3E}">
+        <p14:creationId xmlns:p14="http://schemas.microsoft.com/office/powerpoint/2010/main" val="1631398137"/>
+      </p:ext>
+    </p:extLst>
+  </p:cSld>
+  <p:clrMapOvr>
+    <a:masterClrMapping/>
+  </p:clrMapOvr>
+</p:sldLayout>
+</file>
+
+<file path=ppt/slideLayouts/slideLayout9.xml><?xml version="1.0" encoding="utf-8"?>
 <p:sldLayout xmlns:a="http://schemas.openxmlformats.org/drawingml/2006/main" xmlns:r="http://schemas.openxmlformats.org/officeDocument/2006/relationships" xmlns:p="http://schemas.openxmlformats.org/presentationml/2006/main" type="twoTxTwoObj" preserve="1">
   <p:cSld name="Comparison">
     <p:spTree>
@@ -4723,7 +5144,7 @@
           <a:p>
             <a:fld id="{CE56DC10-3561-4063-A6AF-C1CC7A41040A}" type="datetime1">
               <a:rPr lang="en-US" smtClean="0"/>
-              <a:t>10/19/2015</a:t>
+              <a:t>10/22/2015</a:t>
             </a:fld>
             <a:endParaRPr lang="en-US"/>
           </a:p>
@@ -4781,131 +5202,6 @@
   <p:clrMapOvr>
     <a:masterClrMapping/>
   </p:clrMapOvr>
-</p:sldLayout>
-</file>
-
-<file path=ppt/slideLayouts/slideLayout9.xml><?xml version="1.0" encoding="utf-8"?>
-<p:sldLayout xmlns:a="http://schemas.openxmlformats.org/drawingml/2006/main" xmlns:r="http://schemas.openxmlformats.org/officeDocument/2006/relationships" xmlns:p="http://schemas.openxmlformats.org/presentationml/2006/main" type="titleOnly" preserve="1">
-  <p:cSld name="Title Only">
-    <p:spTree>
-      <p:nvGrpSpPr>
-        <p:cNvPr id="1" name=""/>
-        <p:cNvGrpSpPr/>
-        <p:nvPr/>
-      </p:nvGrpSpPr>
-      <p:grpSpPr>
-        <a:xfrm>
-          <a:off x="0" y="0"/>
-          <a:ext cx="0" cy="0"/>
-          <a:chOff x="0" y="0"/>
-          <a:chExt cx="0" cy="0"/>
-        </a:xfrm>
-      </p:grpSpPr>
-      <p:sp>
-        <p:nvSpPr>
-          <p:cNvPr id="2" name="Title 1"/>
-          <p:cNvSpPr>
-            <a:spLocks noGrp="1"/>
-          </p:cNvSpPr>
-          <p:nvPr>
-            <p:ph type="title"/>
-          </p:nvPr>
-        </p:nvSpPr>
-        <p:spPr/>
-        <p:txBody>
-          <a:bodyPr/>
-          <a:lstStyle/>
-          <a:p>
-            <a:r>
-              <a:rPr lang="en-US" smtClean="0"/>
-              <a:t>Click to edit Master title style</a:t>
-            </a:r>
-            <a:endParaRPr lang="en-US"/>
-          </a:p>
-        </p:txBody>
-      </p:sp>
-      <p:sp>
-        <p:nvSpPr>
-          <p:cNvPr id="3" name="Date Placeholder 2"/>
-          <p:cNvSpPr>
-            <a:spLocks noGrp="1"/>
-          </p:cNvSpPr>
-          <p:nvPr>
-            <p:ph type="dt" sz="half" idx="10"/>
-          </p:nvPr>
-        </p:nvSpPr>
-        <p:spPr/>
-        <p:txBody>
-          <a:bodyPr/>
-          <a:lstStyle/>
-          <a:p>
-            <a:fld id="{2F7B77F5-1464-4F6B-92A8-64FC8A508293}" type="datetime1">
-              <a:rPr lang="en-US" smtClean="0"/>
-              <a:t>10/19/2015</a:t>
-            </a:fld>
-            <a:endParaRPr lang="en-US"/>
-          </a:p>
-        </p:txBody>
-      </p:sp>
-      <p:sp>
-        <p:nvSpPr>
-          <p:cNvPr id="4" name="Footer Placeholder 3"/>
-          <p:cNvSpPr>
-            <a:spLocks noGrp="1"/>
-          </p:cNvSpPr>
-          <p:nvPr>
-            <p:ph type="ftr" sz="quarter" idx="11"/>
-          </p:nvPr>
-        </p:nvSpPr>
-        <p:spPr/>
-        <p:txBody>
-          <a:bodyPr/>
-          <a:lstStyle/>
-          <a:p>
-            <a:endParaRPr lang="en-US"/>
-          </a:p>
-        </p:txBody>
-      </p:sp>
-      <p:sp>
-        <p:nvSpPr>
-          <p:cNvPr id="5" name="Slide Number Placeholder 4"/>
-          <p:cNvSpPr>
-            <a:spLocks noGrp="1"/>
-          </p:cNvSpPr>
-          <p:nvPr>
-            <p:ph type="sldNum" sz="quarter" idx="12"/>
-          </p:nvPr>
-        </p:nvSpPr>
-        <p:spPr/>
-        <p:txBody>
-          <a:bodyPr/>
-          <a:lstStyle/>
-          <a:p>
-            <a:fld id="{2AF3B5EA-18B6-4040-9F78-6052AF49C681}" type="slidenum">
-              <a:rPr lang="en-US" smtClean="0"/>
-              <a:t>‹#›</a:t>
-            </a:fld>
-            <a:endParaRPr lang="en-US"/>
-          </a:p>
-        </p:txBody>
-      </p:sp>
-    </p:spTree>
-    <p:extLst>
-      <p:ext uri="{BB962C8B-B14F-4D97-AF65-F5344CB8AC3E}">
-        <p14:creationId xmlns:p14="http://schemas.microsoft.com/office/powerpoint/2010/main" val="3754008708"/>
-      </p:ext>
-    </p:extLst>
-  </p:cSld>
-  <p:clrMapOvr>
-    <a:masterClrMapping/>
-  </p:clrMapOvr>
-  <p:timing>
-    <p:tnLst>
-      <p:par>
-        <p:cTn id="1" dur="indefinite" restart="never" nodeType="tmRoot"/>
-      </p:par>
-    </p:tnLst>
-  </p:timing>
 </p:sldLayout>
 </file>
 
@@ -5073,7 +5369,7 @@
           <a:p>
             <a:fld id="{02B3F677-983B-48DB-ADFD-63FE6CBC7FB2}" type="datetime1">
               <a:rPr lang="en-US" smtClean="0"/>
-              <a:t>10/19/2015</a:t>
+              <a:t>10/22/2015</a:t>
             </a:fld>
             <a:endParaRPr lang="en-US"/>
           </a:p>
@@ -5173,13 +5469,14 @@
     <p:sldLayoutId id="2147483662" r:id="rId5"/>
     <p:sldLayoutId id="2147483651" r:id="rId6"/>
     <p:sldLayoutId id="2147483652" r:id="rId7"/>
-    <p:sldLayoutId id="2147483653" r:id="rId8"/>
-    <p:sldLayoutId id="2147483654" r:id="rId9"/>
-    <p:sldLayoutId id="2147483655" r:id="rId10"/>
-    <p:sldLayoutId id="2147483656" r:id="rId11"/>
-    <p:sldLayoutId id="2147483657" r:id="rId12"/>
-    <p:sldLayoutId id="2147483658" r:id="rId13"/>
-    <p:sldLayoutId id="2147483659" r:id="rId14"/>
+    <p:sldLayoutId id="2147483663" r:id="rId8"/>
+    <p:sldLayoutId id="2147483653" r:id="rId9"/>
+    <p:sldLayoutId id="2147483654" r:id="rId10"/>
+    <p:sldLayoutId id="2147483655" r:id="rId11"/>
+    <p:sldLayoutId id="2147483656" r:id="rId12"/>
+    <p:sldLayoutId id="2147483657" r:id="rId13"/>
+    <p:sldLayoutId id="2147483658" r:id="rId14"/>
+    <p:sldLayoutId id="2147483659" r:id="rId15"/>
   </p:sldLayoutIdLst>
   <p:timing>
     <p:tnLst>

</xml_diff>